<commit_message>
Attached Dashboard tour videos.  Finalized Monica README
</commit_message>
<xml_diff>
--- a/analysis/Data301 Dashboard final report.pptx
+++ b/analysis/Data301 Dashboard final report.pptx
@@ -555,7 +555,7 @@
             <a:fld id="{5923F103-BC34-4FE4-A40E-EDDEECFDA5D0}" type="datetimeFigureOut">
               <a:rPr lang="en-US" dirty="0"/>
               <a:pPr/>
-              <a:t>4/11/2021</a:t>
+              <a:t>4/13/2021</a:t>
             </a:fld>
             <a:endParaRPr lang="en-US" dirty="0"/>
           </a:p>
@@ -1639,7 +1639,7 @@
           <a:p>
             <a:fld id="{923A1CC3-2375-41D4-9E03-427CAF2A4C1A}" type="datetimeFigureOut">
               <a:rPr lang="en-US" dirty="0"/>
-              <a:t>4/11/2021</a:t>
+              <a:t>4/13/2021</a:t>
             </a:fld>
             <a:endParaRPr lang="en-US" dirty="0"/>
           </a:p>
@@ -2615,7 +2615,7 @@
           <a:p>
             <a:fld id="{AFF16868-8199-4C2C-A5B1-63AEE139F88E}" type="datetimeFigureOut">
               <a:rPr lang="en-US" dirty="0"/>
-              <a:t>4/11/2021</a:t>
+              <a:t>4/13/2021</a:t>
             </a:fld>
             <a:endParaRPr lang="en-US" dirty="0"/>
           </a:p>
@@ -3745,7 +3745,7 @@
           <a:p>
             <a:fld id="{AAD9FF7F-6988-44CC-821B-644E70CD2F73}" type="datetimeFigureOut">
               <a:rPr lang="en-US" dirty="0"/>
-              <a:t>4/11/2021</a:t>
+              <a:t>4/13/2021</a:t>
             </a:fld>
             <a:endParaRPr lang="en-US" dirty="0"/>
           </a:p>
@@ -4774,7 +4774,7 @@
           <a:p>
             <a:fld id="{5C12C299-16B2-4475-990D-751901EACC14}" type="datetimeFigureOut">
               <a:rPr lang="en-US" dirty="0"/>
-              <a:t>4/11/2021</a:t>
+              <a:t>4/13/2021</a:t>
             </a:fld>
             <a:endParaRPr lang="en-US" dirty="0"/>
           </a:p>
@@ -5430,7 +5430,7 @@
           <a:p>
             <a:fld id="{9FE86839-B9D8-4651-8783-F325ECE74E65}" type="datetimeFigureOut">
               <a:rPr lang="en-US" dirty="0"/>
-              <a:t>4/11/2021</a:t>
+              <a:t>4/13/2021</a:t>
             </a:fld>
             <a:endParaRPr lang="en-US" dirty="0"/>
           </a:p>
@@ -6287,7 +6287,7 @@
           <a:p>
             <a:fld id="{FD484F64-32F6-45C5-931F-ADC1662401D0}" type="datetimeFigureOut">
               <a:rPr lang="en-US" dirty="0"/>
-              <a:t>4/11/2021</a:t>
+              <a:t>4/13/2021</a:t>
             </a:fld>
             <a:endParaRPr lang="en-US" dirty="0"/>
           </a:p>
@@ -6473,7 +6473,7 @@
           <a:p>
             <a:fld id="{53086D93-FCAC-47E0-A2EE-787E62CA814C}" type="datetimeFigureOut">
               <a:rPr lang="en-US" dirty="0"/>
-              <a:t>4/11/2021</a:t>
+              <a:t>4/13/2021</a:t>
             </a:fld>
             <a:endParaRPr lang="en-US" dirty="0"/>
           </a:p>
@@ -7441,7 +7441,7 @@
           <a:p>
             <a:fld id="{CDA879A6-0FD0-4734-A311-86BFCA472E6E}" type="datetimeFigureOut">
               <a:rPr lang="en-US" dirty="0"/>
-              <a:t>4/11/2021</a:t>
+              <a:t>4/13/2021</a:t>
             </a:fld>
             <a:endParaRPr lang="en-US" dirty="0"/>
           </a:p>
@@ -7648,7 +7648,7 @@
           <a:p>
             <a:fld id="{19C9CA7B-DFD4-44B5-8C60-D14B8CD1FB59}" type="datetimeFigureOut">
               <a:rPr lang="en-US" dirty="0"/>
-              <a:t>4/11/2021</a:t>
+              <a:t>4/13/2021</a:t>
             </a:fld>
             <a:endParaRPr lang="en-US" dirty="0"/>
           </a:p>
@@ -8678,7 +8678,7 @@
           <a:p>
             <a:fld id="{F34E6425-0181-43F2-84FC-787E803FD2F8}" type="datetimeFigureOut">
               <a:rPr lang="en-US" dirty="0"/>
-              <a:t>4/11/2021</a:t>
+              <a:t>4/13/2021</a:t>
             </a:fld>
             <a:endParaRPr lang="en-US" dirty="0"/>
           </a:p>
@@ -8946,7 +8946,7 @@
           <a:p>
             <a:fld id="{3BDB8791-F1B0-41E7-B7FD-A781E65C4266}" type="datetimeFigureOut">
               <a:rPr lang="en-US" dirty="0"/>
-              <a:t>4/11/2021</a:t>
+              <a:t>4/13/2021</a:t>
             </a:fld>
             <a:endParaRPr lang="en-US" dirty="0"/>
           </a:p>
@@ -9352,7 +9352,7 @@
           <a:p>
             <a:fld id="{5FDD63B2-E120-4ED8-B27B-C685F510A5FE}" type="datetimeFigureOut">
               <a:rPr lang="en-US" dirty="0"/>
-              <a:t>4/11/2021</a:t>
+              <a:t>4/13/2021</a:t>
             </a:fld>
             <a:endParaRPr lang="en-US" dirty="0"/>
           </a:p>
@@ -9475,7 +9475,7 @@
           <a:p>
             <a:fld id="{7AA18ACC-A947-437B-A130-35BD54FDF1E9}" type="datetimeFigureOut">
               <a:rPr lang="en-US" dirty="0"/>
-              <a:t>4/11/2021</a:t>
+              <a:t>4/13/2021</a:t>
             </a:fld>
             <a:endParaRPr lang="en-US" dirty="0"/>
           </a:p>
@@ -9566,7 +9566,7 @@
           <a:p>
             <a:fld id="{7C8D7E02-BCB8-4D50-A234-369438C08659}" type="datetimeFigureOut">
               <a:rPr lang="en-US" dirty="0"/>
-              <a:t>4/11/2021</a:t>
+              <a:t>4/13/2021</a:t>
             </a:fld>
             <a:endParaRPr lang="en-US" dirty="0"/>
           </a:p>
@@ -10643,7 +10643,7 @@
           <a:p>
             <a:fld id="{76E86A4C-8E40-4F87-A4F0-01A0687C5742}" type="datetimeFigureOut">
               <a:rPr lang="en-US" dirty="0"/>
-              <a:t>4/11/2021</a:t>
+              <a:t>4/13/2021</a:t>
             </a:fld>
             <a:endParaRPr lang="en-US" dirty="0"/>
           </a:p>
@@ -11747,7 +11747,7 @@
           <a:p>
             <a:fld id="{35E72C73-2D91-4E12-BA25-F0AA0C03599B}" type="datetimeFigureOut">
               <a:rPr lang="en-US" dirty="0"/>
-              <a:t>4/11/2021</a:t>
+              <a:t>4/13/2021</a:t>
             </a:fld>
             <a:endParaRPr lang="en-US" dirty="0"/>
           </a:p>
@@ -12740,7 +12740,7 @@
           <a:p>
             <a:fld id="{2BE451C3-0FF4-47C4-B829-773ADF60F88C}" type="datetimeFigureOut">
               <a:rPr lang="en-US" dirty="0"/>
-              <a:t>4/11/2021</a:t>
+              <a:t>4/13/2021</a:t>
             </a:fld>
             <a:endParaRPr lang="en-US" dirty="0"/>
           </a:p>

</xml_diff>